<commit_message>
Update Vasily Kuzmich Ryzhov by Relt.pptx
</commit_message>
<xml_diff>
--- a/Vasily Kuzmich Ryzhov by Relt.pptx
+++ b/Vasily Kuzmich Ryzhov by Relt.pptx
@@ -5,7 +5,7 @@
     <p:sldMasterId id="2147483678" r:id="rId1"/>
   </p:sldMasterIdLst>
   <p:notesMasterIdLst>
-    <p:notesMasterId r:id="rId10"/>
+    <p:notesMasterId r:id="rId11"/>
   </p:notesMasterIdLst>
   <p:sldIdLst>
     <p:sldId id="256" r:id="rId2"/>
@@ -16,6 +16,7 @@
     <p:sldId id="261" r:id="rId7"/>
     <p:sldId id="262" r:id="rId8"/>
     <p:sldId id="263" r:id="rId9"/>
+    <p:sldId id="264" r:id="rId10"/>
   </p:sldIdLst>
   <p:sldSz cx="12192000" cy="6858000"/>
   <p:notesSz cx="6858000" cy="9144000"/>
@@ -114,6 +115,11 @@
       </a:defRPr>
     </a:lvl9pPr>
   </p:defaultTextStyle>
+  <p:extLst>
+    <p:ext uri="{EFAFB233-063F-42B5-8137-9DF3F51BA10A}">
+      <p15:sldGuideLst xmlns:p15="http://schemas.microsoft.com/office/powerpoint/2012/main"/>
+    </p:ext>
+  </p:extLst>
 </p:presentation>
 </file>
 
@@ -199,7 +205,7 @@
           <a:p>
             <a:fld id="{75AD28BB-2320-4C89-8D4D-A01109BDD5A4}" type="datetimeFigureOut">
               <a:rPr lang="ru-RU" smtClean="0"/>
-              <a:t>15.04.2019</a:t>
+              <a:t>16.04.2019</a:t>
             </a:fld>
             <a:endParaRPr lang="ru-RU"/>
           </a:p>
@@ -684,7 +690,7 @@
           <a:p>
             <a:fld id="{84C5A4B5-0C97-4493-AA7C-C0366BDCD9FC}" type="datetimeFigureOut">
               <a:rPr lang="ru-RU" smtClean="0"/>
-              <a:t>15.04.2019</a:t>
+              <a:t>16.04.2019</a:t>
             </a:fld>
             <a:endParaRPr lang="ru-RU"/>
           </a:p>
@@ -971,7 +977,7 @@
           <a:p>
             <a:fld id="{84C5A4B5-0C97-4493-AA7C-C0366BDCD9FC}" type="datetimeFigureOut">
               <a:rPr lang="ru-RU" smtClean="0"/>
-              <a:t>15.04.2019</a:t>
+              <a:t>16.04.2019</a:t>
             </a:fld>
             <a:endParaRPr lang="ru-RU"/>
           </a:p>
@@ -1163,7 +1169,7 @@
           <a:p>
             <a:fld id="{84C5A4B5-0C97-4493-AA7C-C0366BDCD9FC}" type="datetimeFigureOut">
               <a:rPr lang="ru-RU" smtClean="0"/>
-              <a:t>15.04.2019</a:t>
+              <a:t>16.04.2019</a:t>
             </a:fld>
             <a:endParaRPr lang="ru-RU"/>
           </a:p>
@@ -1424,7 +1430,7 @@
           <a:p>
             <a:fld id="{84C5A4B5-0C97-4493-AA7C-C0366BDCD9FC}" type="datetimeFigureOut">
               <a:rPr lang="ru-RU" smtClean="0"/>
-              <a:t>15.04.2019</a:t>
+              <a:t>16.04.2019</a:t>
             </a:fld>
             <a:endParaRPr lang="ru-RU"/>
           </a:p>
@@ -1848,7 +1854,7 @@
           <a:p>
             <a:fld id="{84C5A4B5-0C97-4493-AA7C-C0366BDCD9FC}" type="datetimeFigureOut">
               <a:rPr lang="ru-RU" smtClean="0"/>
-              <a:t>15.04.2019</a:t>
+              <a:t>16.04.2019</a:t>
             </a:fld>
             <a:endParaRPr lang="ru-RU"/>
           </a:p>
@@ -2394,7 +2400,7 @@
           <a:p>
             <a:fld id="{84C5A4B5-0C97-4493-AA7C-C0366BDCD9FC}" type="datetimeFigureOut">
               <a:rPr lang="ru-RU" smtClean="0"/>
-              <a:t>15.04.2019</a:t>
+              <a:t>16.04.2019</a:t>
             </a:fld>
             <a:endParaRPr lang="ru-RU"/>
           </a:p>
@@ -3234,7 +3240,7 @@
           <a:p>
             <a:fld id="{84C5A4B5-0C97-4493-AA7C-C0366BDCD9FC}" type="datetimeFigureOut">
               <a:rPr lang="ru-RU" smtClean="0"/>
-              <a:t>15.04.2019</a:t>
+              <a:t>16.04.2019</a:t>
             </a:fld>
             <a:endParaRPr lang="ru-RU"/>
           </a:p>
@@ -3404,7 +3410,7 @@
           <a:p>
             <a:fld id="{84C5A4B5-0C97-4493-AA7C-C0366BDCD9FC}" type="datetimeFigureOut">
               <a:rPr lang="ru-RU" smtClean="0"/>
-              <a:t>15.04.2019</a:t>
+              <a:t>16.04.2019</a:t>
             </a:fld>
             <a:endParaRPr lang="ru-RU"/>
           </a:p>
@@ -3588,7 +3594,7 @@
           <a:p>
             <a:fld id="{84C5A4B5-0C97-4493-AA7C-C0366BDCD9FC}" type="datetimeFigureOut">
               <a:rPr lang="ru-RU" smtClean="0"/>
-              <a:t>15.04.2019</a:t>
+              <a:t>16.04.2019</a:t>
             </a:fld>
             <a:endParaRPr lang="ru-RU"/>
           </a:p>
@@ -3758,7 +3764,7 @@
           <a:p>
             <a:fld id="{84C5A4B5-0C97-4493-AA7C-C0366BDCD9FC}" type="datetimeFigureOut">
               <a:rPr lang="ru-RU" smtClean="0"/>
-              <a:t>15.04.2019</a:t>
+              <a:t>16.04.2019</a:t>
             </a:fld>
             <a:endParaRPr lang="ru-RU"/>
           </a:p>
@@ -4006,7 +4012,7 @@
           <a:p>
             <a:fld id="{84C5A4B5-0C97-4493-AA7C-C0366BDCD9FC}" type="datetimeFigureOut">
               <a:rPr lang="ru-RU" smtClean="0"/>
-              <a:t>15.04.2019</a:t>
+              <a:t>16.04.2019</a:t>
             </a:fld>
             <a:endParaRPr lang="ru-RU"/>
           </a:p>
@@ -4243,7 +4249,7 @@
           <a:p>
             <a:fld id="{84C5A4B5-0C97-4493-AA7C-C0366BDCD9FC}" type="datetimeFigureOut">
               <a:rPr lang="ru-RU" smtClean="0"/>
-              <a:t>15.04.2019</a:t>
+              <a:t>16.04.2019</a:t>
             </a:fld>
             <a:endParaRPr lang="ru-RU"/>
           </a:p>
@@ -4616,7 +4622,7 @@
           <a:p>
             <a:fld id="{84C5A4B5-0C97-4493-AA7C-C0366BDCD9FC}" type="datetimeFigureOut">
               <a:rPr lang="ru-RU" smtClean="0"/>
-              <a:t>15.04.2019</a:t>
+              <a:t>16.04.2019</a:t>
             </a:fld>
             <a:endParaRPr lang="ru-RU"/>
           </a:p>
@@ -4734,7 +4740,7 @@
           <a:p>
             <a:fld id="{84C5A4B5-0C97-4493-AA7C-C0366BDCD9FC}" type="datetimeFigureOut">
               <a:rPr lang="ru-RU" smtClean="0"/>
-              <a:t>15.04.2019</a:t>
+              <a:t>16.04.2019</a:t>
             </a:fld>
             <a:endParaRPr lang="ru-RU"/>
           </a:p>
@@ -4829,7 +4835,7 @@
           <a:p>
             <a:fld id="{84C5A4B5-0C97-4493-AA7C-C0366BDCD9FC}" type="datetimeFigureOut">
               <a:rPr lang="ru-RU" smtClean="0"/>
-              <a:t>15.04.2019</a:t>
+              <a:t>16.04.2019</a:t>
             </a:fld>
             <a:endParaRPr lang="ru-RU"/>
           </a:p>
@@ -5080,7 +5086,7 @@
           <a:p>
             <a:fld id="{84C5A4B5-0C97-4493-AA7C-C0366BDCD9FC}" type="datetimeFigureOut">
               <a:rPr lang="ru-RU" smtClean="0"/>
-              <a:t>15.04.2019</a:t>
+              <a:t>16.04.2019</a:t>
             </a:fld>
             <a:endParaRPr lang="ru-RU"/>
           </a:p>
@@ -5367,7 +5373,7 @@
           <a:p>
             <a:fld id="{84C5A4B5-0C97-4493-AA7C-C0366BDCD9FC}" type="datetimeFigureOut">
               <a:rPr lang="ru-RU" smtClean="0"/>
-              <a:t>15.04.2019</a:t>
+              <a:t>16.04.2019</a:t>
             </a:fld>
             <a:endParaRPr lang="ru-RU"/>
           </a:p>
@@ -5580,7 +5586,7 @@
           <a:p>
             <a:fld id="{84C5A4B5-0C97-4493-AA7C-C0366BDCD9FC}" type="datetimeFigureOut">
               <a:rPr lang="ru-RU" smtClean="0"/>
-              <a:t>15.04.2019</a:t>
+              <a:t>16.04.2019</a:t>
             </a:fld>
             <a:endParaRPr lang="ru-RU"/>
           </a:p>
@@ -6129,6 +6135,9 @@
   <p:clrMapOvr>
     <a:masterClrMapping/>
   </p:clrMapOvr>
+  <p:transition spd="slow">
+    <p:push dir="u"/>
+  </p:transition>
   <p:timing>
     <p:tnLst>
       <p:par>
@@ -6253,6 +6262,9 @@
   <p:clrMapOvr>
     <a:masterClrMapping/>
   </p:clrMapOvr>
+  <p:transition spd="slow">
+    <p:push dir="u"/>
+  </p:transition>
   <p:timing>
     <p:tnLst>
       <p:par>
@@ -6323,6 +6335,9 @@
   <p:clrMapOvr>
     <a:masterClrMapping/>
   </p:clrMapOvr>
+  <p:transition spd="slow">
+    <p:push dir="u"/>
+  </p:transition>
   <p:timing>
     <p:tnLst>
       <p:par>
@@ -6451,6 +6466,9 @@
   <p:clrMapOvr>
     <a:masterClrMapping/>
   </p:clrMapOvr>
+  <p:transition spd="slow">
+    <p:push dir="u"/>
+  </p:transition>
   <p:timing>
     <p:tnLst>
       <p:par>
@@ -6549,6 +6567,9 @@
   <p:clrMapOvr>
     <a:masterClrMapping/>
   </p:clrMapOvr>
+  <p:transition spd="slow">
+    <p:push dir="u"/>
+  </p:transition>
   <p:timing>
     <p:tnLst>
       <p:par>
@@ -6658,6 +6679,9 @@
   <p:clrMapOvr>
     <a:masterClrMapping/>
   </p:clrMapOvr>
+  <p:transition spd="slow">
+    <p:push dir="u"/>
+  </p:transition>
   <p:timing>
     <p:tnLst>
       <p:par>
@@ -6776,6 +6800,9 @@
   <p:clrMapOvr>
     <a:masterClrMapping/>
   </p:clrMapOvr>
+  <p:transition spd="slow">
+    <p:push dir="u"/>
+  </p:transition>
   <p:timing>
     <p:tnLst>
       <p:par>
@@ -6803,38 +6830,48 @@
           <a:chExt cx="0" cy="0"/>
         </a:xfrm>
       </p:grpSpPr>
-      <p:sp>
-        <p:nvSpPr>
-          <p:cNvPr id="3" name="Объект 2"/>
-          <p:cNvSpPr>
-            <a:spLocks noGrp="1"/>
-          </p:cNvSpPr>
+      <p:pic>
+        <p:nvPicPr>
+          <p:cNvPr id="2" name="Объект 1"/>
+          <p:cNvPicPr>
+            <a:picLocks noGrp="1" noChangeAspect="1"/>
+          </p:cNvPicPr>
           <p:nvPr>
             <p:ph idx="1"/>
           </p:nvPr>
-        </p:nvSpPr>
-        <p:spPr/>
-        <p:txBody>
-          <a:bodyPr/>
-          <a:lstStyle/>
-          <a:p>
-            <a:endParaRPr lang="ru-RU" dirty="0"/>
-          </a:p>
-        </p:txBody>
-      </p:sp>
-      <p:sp>
-        <p:nvSpPr>
-          <p:cNvPr id="4" name="Текст 3"/>
-          <p:cNvSpPr>
-            <a:spLocks noGrp="1"/>
-          </p:cNvSpPr>
-          <p:nvPr>
-            <p:ph type="body" sz="half" idx="2"/>
-          </p:nvPr>
-        </p:nvSpPr>
+        </p:nvPicPr>
+        <p:blipFill>
+          <a:blip r:embed="rId2">
+            <a:extLst>
+              <a:ext uri="{28A0092B-C50C-407E-A947-70E740481C1C}">
+                <a14:useLocalDpi xmlns:a14="http://schemas.microsoft.com/office/drawing/2010/main" val="0"/>
+              </a:ext>
+            </a:extLst>
+          </a:blip>
+          <a:stretch>
+            <a:fillRect/>
+          </a:stretch>
+        </p:blipFill>
         <p:spPr>
           <a:xfrm>
-            <a:off x="691596" y="609600"/>
+            <a:off x="5582444" y="609600"/>
+            <a:ext cx="5181600" cy="5181600"/>
+          </a:xfrm>
+        </p:spPr>
+      </p:pic>
+      <p:sp>
+        <p:nvSpPr>
+          <p:cNvPr id="4" name="Текст 3"/>
+          <p:cNvSpPr>
+            <a:spLocks noGrp="1"/>
+          </p:cNvSpPr>
+          <p:nvPr>
+            <p:ph type="body" sz="half" idx="2"/>
+          </p:nvPr>
+        </p:nvSpPr>
+        <p:spPr>
+          <a:xfrm>
+            <a:off x="845975" y="609600"/>
             <a:ext cx="3932237" cy="5181600"/>
           </a:xfrm>
         </p:spPr>
@@ -6880,6 +6917,107 @@
   <p:clrMapOvr>
     <a:masterClrMapping/>
   </p:clrMapOvr>
+  <p:transition spd="slow">
+    <p:push dir="u"/>
+  </p:transition>
+  <p:timing>
+    <p:tnLst>
+      <p:par>
+        <p:cTn id="1" dur="indefinite" restart="never" nodeType="tmRoot"/>
+      </p:par>
+    </p:tnLst>
+  </p:timing>
+</p:sld>
+</file>
+
+<file path=ppt/slides/slide9.xml><?xml version="1.0" encoding="utf-8"?>
+<p:sld xmlns:a="http://schemas.openxmlformats.org/drawingml/2006/main" xmlns:r="http://schemas.openxmlformats.org/officeDocument/2006/relationships" xmlns:p="http://schemas.openxmlformats.org/presentationml/2006/main">
+  <p:cSld>
+    <p:spTree>
+      <p:nvGrpSpPr>
+        <p:cNvPr id="1" name=""/>
+        <p:cNvGrpSpPr/>
+        <p:nvPr/>
+      </p:nvGrpSpPr>
+      <p:grpSpPr>
+        <a:xfrm>
+          <a:off x="0" y="0"/>
+          <a:ext cx="0" cy="0"/>
+          <a:chOff x="0" y="0"/>
+          <a:chExt cx="0" cy="0"/>
+        </a:xfrm>
+      </p:grpSpPr>
+      <p:sp>
+        <p:nvSpPr>
+          <p:cNvPr id="2" name="Заголовок 1"/>
+          <p:cNvSpPr>
+            <a:spLocks noGrp="1"/>
+          </p:cNvSpPr>
+          <p:nvPr>
+            <p:ph type="title"/>
+          </p:nvPr>
+        </p:nvSpPr>
+        <p:spPr>
+          <a:xfrm>
+            <a:off x="1229244" y="657227"/>
+            <a:ext cx="9733512" cy="839064"/>
+          </a:xfrm>
+        </p:spPr>
+        <p:txBody>
+          <a:bodyPr/>
+          <a:lstStyle/>
+          <a:p>
+            <a:r>
+              <a:rPr lang="ru-RU" dirty="0" smtClean="0"/>
+              <a:t>Спасибо за внимание</a:t>
+            </a:r>
+            <a:endParaRPr lang="ru-RU" dirty="0"/>
+          </a:p>
+        </p:txBody>
+      </p:sp>
+      <p:pic>
+        <p:nvPicPr>
+          <p:cNvPr id="4" name="Рисунок 3"/>
+          <p:cNvPicPr>
+            <a:picLocks noChangeAspect="1"/>
+          </p:cNvPicPr>
+          <p:nvPr/>
+        </p:nvPicPr>
+        <p:blipFill>
+          <a:blip r:embed="rId2">
+            <a:extLst>
+              <a:ext uri="{28A0092B-C50C-407E-A947-70E740481C1C}">
+                <a14:useLocalDpi xmlns:a14="http://schemas.microsoft.com/office/drawing/2010/main" val="0"/>
+              </a:ext>
+            </a:extLst>
+          </a:blip>
+          <a:stretch>
+            <a:fillRect/>
+          </a:stretch>
+        </p:blipFill>
+        <p:spPr>
+          <a:xfrm>
+            <a:off x="4225471" y="2186048"/>
+            <a:ext cx="3741057" cy="3741057"/>
+          </a:xfrm>
+          <a:prstGeom prst="rect">
+            <a:avLst/>
+          </a:prstGeom>
+        </p:spPr>
+      </p:pic>
+    </p:spTree>
+    <p:extLst>
+      <p:ext uri="{BB962C8B-B14F-4D97-AF65-F5344CB8AC3E}">
+        <p14:creationId xmlns:p14="http://schemas.microsoft.com/office/powerpoint/2010/main" val="1098307586"/>
+      </p:ext>
+    </p:extLst>
+  </p:cSld>
+  <p:clrMapOvr>
+    <a:masterClrMapping/>
+  </p:clrMapOvr>
+  <p:transition spd="slow">
+    <p:push dir="u"/>
+  </p:transition>
   <p:timing>
     <p:tnLst>
       <p:par>

</xml_diff>